<commit_message>
docs: Add architecture design diagram in powerpoint format
</commit_message>
<xml_diff>
--- a/docs/gcc-landing-zone-design.pptx
+++ b/docs/gcc-landing-zone-design.pptx
@@ -3796,8 +3796,8 @@
         </p:nvSpPr>
         <p:spPr>
           <a:xfrm>
-            <a:off x="984521" y="1251060"/>
-            <a:ext cx="3690425" cy="2390917"/>
+            <a:off x="984522" y="1251060"/>
+            <a:ext cx="3558514" cy="2390917"/>
           </a:xfrm>
           <a:prstGeom prst="roundRect">
             <a:avLst>
@@ -4449,8 +4449,8 @@
         </p:blipFill>
         <p:spPr bwMode="auto">
           <a:xfrm>
-            <a:off x="626309" y="2908187"/>
-            <a:ext cx="295075" cy="384754"/>
+            <a:off x="626310" y="2908187"/>
+            <a:ext cx="279738" cy="364756"/>
           </a:xfrm>
           <a:prstGeom prst="rect">
             <a:avLst/>
@@ -4496,8 +4496,8 @@
         </p:blipFill>
         <p:spPr bwMode="auto">
           <a:xfrm>
-            <a:off x="615005" y="3290326"/>
-            <a:ext cx="320235" cy="397215"/>
+            <a:off x="615006" y="3290326"/>
+            <a:ext cx="303590" cy="376569"/>
           </a:xfrm>
           <a:prstGeom prst="rect">
             <a:avLst/>
@@ -4544,7 +4544,7 @@
         <p:spPr bwMode="auto">
           <a:xfrm>
             <a:off x="568660" y="2573828"/>
-            <a:ext cx="387219" cy="363206"/>
+            <a:ext cx="367093" cy="344328"/>
           </a:xfrm>
           <a:prstGeom prst="rect">
             <a:avLst/>
@@ -4719,8 +4719,8 @@
         </p:nvCxnSpPr>
         <p:spPr>
           <a:xfrm flipH="1" flipV="1">
-            <a:off x="955879" y="2755431"/>
-            <a:ext cx="548846" cy="522811"/>
+            <a:off x="935753" y="2745992"/>
+            <a:ext cx="568972" cy="532250"/>
           </a:xfrm>
           <a:prstGeom prst="straightConnector1">
             <a:avLst/>
@@ -4836,7 +4836,7 @@
         <p:spPr>
           <a:xfrm>
             <a:off x="2935812" y="221627"/>
-            <a:ext cx="1746719" cy="801189"/>
+            <a:ext cx="1607223" cy="801189"/>
           </a:xfrm>
           <a:prstGeom prst="roundRect">
             <a:avLst>
@@ -6891,7 +6891,7 @@
         </p:nvSpPr>
         <p:spPr>
           <a:xfrm>
-            <a:off x="5264532" y="4752787"/>
+            <a:off x="5261286" y="4759412"/>
             <a:ext cx="696534" cy="387334"/>
           </a:xfrm>
           <a:prstGeom prst="roundRect">
@@ -7627,6 +7627,168 @@
           </a:extLst>
         </p:spPr>
       </p:pic>
+      <p:pic>
+        <p:nvPicPr>
+          <p:cNvPr id="3" name="Picture 2">
+            <a:extLst>
+              <a:ext uri="{FF2B5EF4-FFF2-40B4-BE49-F238E27FC236}">
+                <a16:creationId xmlns:a16="http://schemas.microsoft.com/office/drawing/2014/main" id="{F4CD3F42-42AA-343D-3225-8029E6BEDEF8}"/>
+              </a:ext>
+            </a:extLst>
+          </p:cNvPr>
+          <p:cNvPicPr>
+            <a:picLocks noChangeAspect="1"/>
+          </p:cNvPicPr>
+          <p:nvPr/>
+        </p:nvPicPr>
+        <p:blipFill>
+          <a:blip r:embed="rId27"/>
+          <a:stretch>
+            <a:fillRect/>
+          </a:stretch>
+        </p:blipFill>
+        <p:spPr>
+          <a:xfrm>
+            <a:off x="4630232" y="2501489"/>
+            <a:ext cx="311944" cy="252413"/>
+          </a:xfrm>
+          <a:prstGeom prst="rect">
+            <a:avLst/>
+          </a:prstGeom>
+        </p:spPr>
+      </p:pic>
+      <p:cxnSp>
+        <p:nvCxnSpPr>
+          <p:cNvPr id="7" name="Straight Arrow Connector 6">
+            <a:extLst>
+              <a:ext uri="{FF2B5EF4-FFF2-40B4-BE49-F238E27FC236}">
+                <a16:creationId xmlns:a16="http://schemas.microsoft.com/office/drawing/2014/main" id="{80FEE8A2-10DE-2892-B701-A634071F13B0}"/>
+              </a:ext>
+            </a:extLst>
+          </p:cNvPr>
+          <p:cNvCxnSpPr>
+            <a:cxnSpLocks/>
+            <a:stCxn id="1111" idx="3"/>
+            <a:endCxn id="3" idx="1"/>
+          </p:cNvCxnSpPr>
+          <p:nvPr/>
+        </p:nvCxnSpPr>
+        <p:spPr>
+          <a:xfrm flipV="1">
+            <a:off x="3881306" y="2627696"/>
+            <a:ext cx="748926" cy="184774"/>
+          </a:xfrm>
+          <a:prstGeom prst="straightConnector1">
+            <a:avLst/>
+          </a:prstGeom>
+          <a:ln>
+            <a:tailEnd type="triangle"/>
+          </a:ln>
+        </p:spPr>
+        <p:style>
+          <a:lnRef idx="1">
+            <a:schemeClr val="accent1"/>
+          </a:lnRef>
+          <a:fillRef idx="0">
+            <a:schemeClr val="accent1"/>
+          </a:fillRef>
+          <a:effectRef idx="0">
+            <a:schemeClr val="accent1"/>
+          </a:effectRef>
+          <a:fontRef idx="minor">
+            <a:schemeClr val="tx1"/>
+          </a:fontRef>
+        </p:style>
+      </p:cxnSp>
+      <p:pic>
+        <p:nvPicPr>
+          <p:cNvPr id="14" name="Picture 2">
+            <a:extLst>
+              <a:ext uri="{FF2B5EF4-FFF2-40B4-BE49-F238E27FC236}">
+                <a16:creationId xmlns:a16="http://schemas.microsoft.com/office/drawing/2014/main" id="{5016A3B7-0442-0151-7E9B-0660379EC3F3}"/>
+              </a:ext>
+            </a:extLst>
+          </p:cNvPr>
+          <p:cNvPicPr>
+            <a:picLocks noChangeAspect="1" noChangeArrowheads="1"/>
+          </p:cNvPicPr>
+          <p:nvPr/>
+        </p:nvPicPr>
+        <p:blipFill>
+          <a:blip r:embed="rId28">
+            <a:extLst>
+              <a:ext uri="{28A0092B-C50C-407E-A947-70E740481C1C}">
+                <a14:useLocalDpi xmlns:a14="http://schemas.microsoft.com/office/drawing/2010/main" val="0"/>
+              </a:ext>
+            </a:extLst>
+          </a:blip>
+          <a:srcRect/>
+          <a:stretch>
+            <a:fillRect/>
+          </a:stretch>
+        </p:blipFill>
+        <p:spPr bwMode="auto">
+          <a:xfrm>
+            <a:off x="4648910" y="2795377"/>
+            <a:ext cx="293265" cy="300139"/>
+          </a:xfrm>
+          <a:prstGeom prst="rect">
+            <a:avLst/>
+          </a:prstGeom>
+          <a:noFill/>
+          <a:extLst>
+            <a:ext uri="{909E8E84-426E-40DD-AFC4-6F175D3DCCD1}">
+              <a14:hiddenFill xmlns:a14="http://schemas.microsoft.com/office/drawing/2010/main">
+                <a:solidFill>
+                  <a:srgbClr val="FFFFFF"/>
+                </a:solidFill>
+              </a14:hiddenFill>
+            </a:ext>
+          </a:extLst>
+        </p:spPr>
+      </p:pic>
+      <p:cxnSp>
+        <p:nvCxnSpPr>
+          <p:cNvPr id="22" name="Straight Arrow Connector 21">
+            <a:extLst>
+              <a:ext uri="{FF2B5EF4-FFF2-40B4-BE49-F238E27FC236}">
+                <a16:creationId xmlns:a16="http://schemas.microsoft.com/office/drawing/2014/main" id="{9D6E8B29-88D8-AA58-DE86-6F9C2A863844}"/>
+              </a:ext>
+            </a:extLst>
+          </p:cNvPr>
+          <p:cNvCxnSpPr>
+            <a:stCxn id="1111" idx="3"/>
+            <a:endCxn id="14" idx="1"/>
+          </p:cNvCxnSpPr>
+          <p:nvPr/>
+        </p:nvCxnSpPr>
+        <p:spPr>
+          <a:xfrm>
+            <a:off x="3881306" y="2812470"/>
+            <a:ext cx="767604" cy="132977"/>
+          </a:xfrm>
+          <a:prstGeom prst="straightConnector1">
+            <a:avLst/>
+          </a:prstGeom>
+          <a:ln>
+            <a:tailEnd type="triangle"/>
+          </a:ln>
+        </p:spPr>
+        <p:style>
+          <a:lnRef idx="1">
+            <a:schemeClr val="accent1"/>
+          </a:lnRef>
+          <a:fillRef idx="0">
+            <a:schemeClr val="accent1"/>
+          </a:fillRef>
+          <a:effectRef idx="0">
+            <a:schemeClr val="accent1"/>
+          </a:effectRef>
+          <a:fontRef idx="minor">
+            <a:schemeClr val="tx1"/>
+          </a:fontRef>
+        </p:style>
+      </p:cxnSp>
     </p:spTree>
     <p:extLst>
       <p:ext uri="{BB962C8B-B14F-4D97-AF65-F5344CB8AC3E}">

</xml_diff>